<commit_message>
Build uo structure and add run.bat
</commit_message>
<xml_diff>
--- a/ASM_CourseProject/lab/week11/week14_lab12.pptx
+++ b/ASM_CourseProject/lab/week11/week14_lab12.pptx
@@ -5,7 +5,7 @@
     <p:sldMasterId id="2147483660" r:id="rId2"/>
   </p:sldMasterIdLst>
   <p:notesMasterIdLst>
-    <p:notesMasterId r:id="rId12"/>
+    <p:notesMasterId r:id="rId13"/>
   </p:notesMasterIdLst>
   <p:sldIdLst>
     <p:sldId id="256" r:id="rId3"/>
@@ -17,6 +17,7 @@
     <p:sldId id="271" r:id="rId9"/>
     <p:sldId id="265" r:id="rId10"/>
     <p:sldId id="266" r:id="rId11"/>
+    <p:sldId id="273" r:id="rId12"/>
   </p:sldIdLst>
   <p:sldSz cx="12192000" cy="6858000"/>
   <p:notesSz cx="6858000" cy="9144000"/>
@@ -4779,6 +4780,2097 @@
     <p:extLst>
       <p:ext uri="{BB962C8B-B14F-4D97-AF65-F5344CB8AC3E}">
         <p14:creationId xmlns:p14="http://schemas.microsoft.com/office/powerpoint/2010/main" val="2471807738"/>
+      </p:ext>
+    </p:extLst>
+  </p:cSld>
+  <p:clrMapOvr>
+    <a:masterClrMapping/>
+  </p:clrMapOvr>
+</p:sld>
+</file>
+
+<file path=ppt/slides/slide10.xml><?xml version="1.0" encoding="utf-8"?>
+<p:sld xmlns:a="http://schemas.openxmlformats.org/drawingml/2006/main" xmlns:r="http://schemas.openxmlformats.org/officeDocument/2006/relationships" xmlns:p="http://schemas.openxmlformats.org/presentationml/2006/main">
+  <p:cSld>
+    <p:spTree>
+      <p:nvGrpSpPr>
+        <p:cNvPr id="1" name=""/>
+        <p:cNvGrpSpPr/>
+        <p:nvPr/>
+      </p:nvGrpSpPr>
+      <p:grpSpPr>
+        <a:xfrm>
+          <a:off x="0" y="0"/>
+          <a:ext cx="0" cy="0"/>
+          <a:chOff x="0" y="0"/>
+          <a:chExt cx="0" cy="0"/>
+        </a:xfrm>
+      </p:grpSpPr>
+      <p:sp>
+        <p:nvSpPr>
+          <p:cNvPr id="53" name="手繪多邊形: 圖案 52">
+            <a:extLst>
+              <a:ext uri="{FF2B5EF4-FFF2-40B4-BE49-F238E27FC236}">
+                <a16:creationId xmlns:a16="http://schemas.microsoft.com/office/drawing/2014/main" id="{235EF87C-6BA0-6AEC-6242-6CB077529AB2}"/>
+              </a:ext>
+            </a:extLst>
+          </p:cNvPr>
+          <p:cNvSpPr/>
+          <p:nvPr/>
+        </p:nvSpPr>
+        <p:spPr>
+          <a:xfrm>
+            <a:off x="2509157" y="-2557462"/>
+            <a:ext cx="7173685" cy="11972924"/>
+          </a:xfrm>
+          <a:custGeom>
+            <a:avLst/>
+            <a:gdLst>
+              <a:gd name="connsiteX0" fmla="*/ 0 w 7173685"/>
+              <a:gd name="connsiteY0" fmla="*/ 0 h 11972924"/>
+              <a:gd name="connsiteX1" fmla="*/ 7173685 w 7173685"/>
+              <a:gd name="connsiteY1" fmla="*/ 0 h 11972924"/>
+              <a:gd name="connsiteX2" fmla="*/ 7173685 w 7173685"/>
+              <a:gd name="connsiteY2" fmla="*/ 11972924 h 11972924"/>
+              <a:gd name="connsiteX3" fmla="*/ 0 w 7173685"/>
+              <a:gd name="connsiteY3" fmla="*/ 11972924 h 11972924"/>
+            </a:gdLst>
+            <a:ahLst/>
+            <a:cxnLst>
+              <a:cxn ang="0">
+                <a:pos x="connsiteX0" y="connsiteY0"/>
+              </a:cxn>
+              <a:cxn ang="0">
+                <a:pos x="connsiteX1" y="connsiteY1"/>
+              </a:cxn>
+              <a:cxn ang="0">
+                <a:pos x="connsiteX2" y="connsiteY2"/>
+              </a:cxn>
+              <a:cxn ang="0">
+                <a:pos x="connsiteX3" y="connsiteY3"/>
+              </a:cxn>
+            </a:cxnLst>
+            <a:rect l="l" t="t" r="r" b="b"/>
+            <a:pathLst>
+              <a:path w="7173685" h="11972924">
+                <a:moveTo>
+                  <a:pt x="0" y="0"/>
+                </a:moveTo>
+                <a:lnTo>
+                  <a:pt x="7173685" y="0"/>
+                </a:lnTo>
+                <a:lnTo>
+                  <a:pt x="7173685" y="11972924"/>
+                </a:lnTo>
+                <a:lnTo>
+                  <a:pt x="0" y="11972924"/>
+                </a:lnTo>
+                <a:close/>
+              </a:path>
+            </a:pathLst>
+          </a:custGeom>
+          <a:solidFill>
+            <a:srgbClr val="1E1E1E"/>
+          </a:solidFill>
+          <a:ln>
+            <a:noFill/>
+          </a:ln>
+        </p:spPr>
+        <p:style>
+          <a:lnRef idx="2">
+            <a:schemeClr val="accent1">
+              <a:shade val="50000"/>
+            </a:schemeClr>
+          </a:lnRef>
+          <a:fillRef idx="1">
+            <a:schemeClr val="accent1"/>
+          </a:fillRef>
+          <a:effectRef idx="0">
+            <a:schemeClr val="accent1"/>
+          </a:effectRef>
+          <a:fontRef idx="minor">
+            <a:schemeClr val="lt1"/>
+          </a:fontRef>
+        </p:style>
+        <p:txBody>
+          <a:bodyPr wrap="square" rtlCol="0" anchor="ctr">
+            <a:noAutofit/>
+          </a:bodyPr>
+          <a:lstStyle/>
+          <a:p>
+            <a:pPr algn="ctr"/>
+            <a:endParaRPr lang="zh-TW" altLang="en-US"/>
+          </a:p>
+        </p:txBody>
+      </p:sp>
+      <p:pic>
+        <p:nvPicPr>
+          <p:cNvPr id="1026" name="Picture 2">
+            <a:extLst>
+              <a:ext uri="{FF2B5EF4-FFF2-40B4-BE49-F238E27FC236}">
+                <a16:creationId xmlns:a16="http://schemas.microsoft.com/office/drawing/2014/main" id="{E2ACB188-CB38-3C73-A6AE-9997D9D28D60}"/>
+              </a:ext>
+            </a:extLst>
+          </p:cNvPr>
+          <p:cNvPicPr>
+            <a:picLocks noChangeAspect="1" noChangeArrowheads="1"/>
+          </p:cNvPicPr>
+          <p:nvPr/>
+        </p:nvPicPr>
+        <p:blipFill>
+          <a:blip r:embed="rId2">
+            <a:extLst>
+              <a:ext uri="{28A0092B-C50C-407E-A947-70E740481C1C}">
+                <a14:useLocalDpi xmlns:a14="http://schemas.microsoft.com/office/drawing/2010/main" val="0"/>
+              </a:ext>
+            </a:extLst>
+          </a:blip>
+          <a:srcRect/>
+          <a:stretch>
+            <a:fillRect/>
+          </a:stretch>
+        </p:blipFill>
+        <p:spPr bwMode="auto">
+          <a:xfrm>
+            <a:off x="2502804" y="-2557463"/>
+            <a:ext cx="4581525" cy="2781300"/>
+          </a:xfrm>
+          <a:prstGeom prst="rect">
+            <a:avLst/>
+          </a:prstGeom>
+          <a:noFill/>
+          <a:extLst>
+            <a:ext uri="{909E8E84-426E-40DD-AFC4-6F175D3DCCD1}">
+              <a14:hiddenFill xmlns:a14="http://schemas.microsoft.com/office/drawing/2010/main">
+                <a:solidFill>
+                  <a:srgbClr val="FFFFFF"/>
+                </a:solidFill>
+              </a14:hiddenFill>
+            </a:ext>
+          </a:extLst>
+        </p:spPr>
+      </p:pic>
+      <p:pic>
+        <p:nvPicPr>
+          <p:cNvPr id="1028" name="Picture 4">
+            <a:extLst>
+              <a:ext uri="{FF2B5EF4-FFF2-40B4-BE49-F238E27FC236}">
+                <a16:creationId xmlns:a16="http://schemas.microsoft.com/office/drawing/2014/main" id="{C79E4889-E50B-114A-17C9-D128717AB018}"/>
+              </a:ext>
+            </a:extLst>
+          </p:cNvPr>
+          <p:cNvPicPr>
+            <a:picLocks noChangeAspect="1" noChangeArrowheads="1"/>
+          </p:cNvPicPr>
+          <p:nvPr/>
+        </p:nvPicPr>
+        <p:blipFill>
+          <a:blip r:embed="rId3">
+            <a:extLst>
+              <a:ext uri="{28A0092B-C50C-407E-A947-70E740481C1C}">
+                <a14:useLocalDpi xmlns:a14="http://schemas.microsoft.com/office/drawing/2010/main" val="0"/>
+              </a:ext>
+            </a:extLst>
+          </a:blip>
+          <a:srcRect/>
+          <a:stretch>
+            <a:fillRect/>
+          </a:stretch>
+        </p:blipFill>
+        <p:spPr bwMode="auto">
+          <a:xfrm>
+            <a:off x="2509154" y="223837"/>
+            <a:ext cx="5210175" cy="6153150"/>
+          </a:xfrm>
+          <a:prstGeom prst="rect">
+            <a:avLst/>
+          </a:prstGeom>
+          <a:noFill/>
+          <a:extLst>
+            <a:ext uri="{909E8E84-426E-40DD-AFC4-6F175D3DCCD1}">
+              <a14:hiddenFill xmlns:a14="http://schemas.microsoft.com/office/drawing/2010/main">
+                <a:solidFill>
+                  <a:srgbClr val="FFFFFF"/>
+                </a:solidFill>
+              </a14:hiddenFill>
+            </a:ext>
+          </a:extLst>
+        </p:spPr>
+      </p:pic>
+      <p:pic>
+        <p:nvPicPr>
+          <p:cNvPr id="1030" name="Picture 6">
+            <a:extLst>
+              <a:ext uri="{FF2B5EF4-FFF2-40B4-BE49-F238E27FC236}">
+                <a16:creationId xmlns:a16="http://schemas.microsoft.com/office/drawing/2014/main" id="{6C093579-C1E0-71BB-4565-A7EF183136B2}"/>
+              </a:ext>
+            </a:extLst>
+          </p:cNvPr>
+          <p:cNvPicPr>
+            <a:picLocks noChangeAspect="1" noChangeArrowheads="1"/>
+          </p:cNvPicPr>
+          <p:nvPr/>
+        </p:nvPicPr>
+        <p:blipFill>
+          <a:blip r:embed="rId4">
+            <a:extLst>
+              <a:ext uri="{28A0092B-C50C-407E-A947-70E740481C1C}">
+                <a14:useLocalDpi xmlns:a14="http://schemas.microsoft.com/office/drawing/2010/main" val="0"/>
+              </a:ext>
+            </a:extLst>
+          </a:blip>
+          <a:srcRect/>
+          <a:stretch>
+            <a:fillRect/>
+          </a:stretch>
+        </p:blipFill>
+        <p:spPr bwMode="auto">
+          <a:xfrm>
+            <a:off x="2528206" y="6376987"/>
+            <a:ext cx="5219700" cy="3038475"/>
+          </a:xfrm>
+          <a:prstGeom prst="rect">
+            <a:avLst/>
+          </a:prstGeom>
+          <a:noFill/>
+          <a:extLst>
+            <a:ext uri="{909E8E84-426E-40DD-AFC4-6F175D3DCCD1}">
+              <a14:hiddenFill xmlns:a14="http://schemas.microsoft.com/office/drawing/2010/main">
+                <a:solidFill>
+                  <a:srgbClr val="FFFFFF"/>
+                </a:solidFill>
+              </a14:hiddenFill>
+            </a:ext>
+          </a:extLst>
+        </p:spPr>
+      </p:pic>
+      <p:sp>
+        <p:nvSpPr>
+          <p:cNvPr id="9" name="矩形 8">
+            <a:extLst>
+              <a:ext uri="{FF2B5EF4-FFF2-40B4-BE49-F238E27FC236}">
+                <a16:creationId xmlns:a16="http://schemas.microsoft.com/office/drawing/2014/main" id="{21015E56-8737-3268-BFE4-0D4D04900AD4}"/>
+              </a:ext>
+            </a:extLst>
+          </p:cNvPr>
+          <p:cNvSpPr/>
+          <p:nvPr/>
+        </p:nvSpPr>
+        <p:spPr>
+          <a:xfrm>
+            <a:off x="2788238" y="-2293849"/>
+            <a:ext cx="5059680" cy="327660"/>
+          </a:xfrm>
+          <a:prstGeom prst="rect">
+            <a:avLst/>
+          </a:prstGeom>
+          <a:solidFill>
+            <a:schemeClr val="bg1">
+              <a:alpha val="8000"/>
+            </a:schemeClr>
+          </a:solidFill>
+          <a:ln>
+            <a:solidFill>
+              <a:schemeClr val="bg1">
+                <a:alpha val="25000"/>
+              </a:schemeClr>
+            </a:solidFill>
+          </a:ln>
+        </p:spPr>
+        <p:style>
+          <a:lnRef idx="2">
+            <a:schemeClr val="accent1">
+              <a:shade val="50000"/>
+            </a:schemeClr>
+          </a:lnRef>
+          <a:fillRef idx="1">
+            <a:schemeClr val="accent1"/>
+          </a:fillRef>
+          <a:effectRef idx="0">
+            <a:schemeClr val="accent1"/>
+          </a:effectRef>
+          <a:fontRef idx="minor">
+            <a:schemeClr val="lt1"/>
+          </a:fontRef>
+        </p:style>
+        <p:txBody>
+          <a:bodyPr rtlCol="0" anchor="ctr"/>
+          <a:lstStyle/>
+          <a:p>
+            <a:pPr algn="ctr"/>
+            <a:endParaRPr lang="zh-TW" altLang="en-US"/>
+          </a:p>
+        </p:txBody>
+      </p:sp>
+      <p:sp>
+        <p:nvSpPr>
+          <p:cNvPr id="10" name="矩形 9">
+            <a:extLst>
+              <a:ext uri="{FF2B5EF4-FFF2-40B4-BE49-F238E27FC236}">
+                <a16:creationId xmlns:a16="http://schemas.microsoft.com/office/drawing/2014/main" id="{F845232B-6991-4AE9-33B8-DF4DFE6532B9}"/>
+              </a:ext>
+            </a:extLst>
+          </p:cNvPr>
+          <p:cNvSpPr/>
+          <p:nvPr/>
+        </p:nvSpPr>
+        <p:spPr>
+          <a:xfrm>
+            <a:off x="7802198" y="-2345909"/>
+            <a:ext cx="1723549" cy="261610"/>
+          </a:xfrm>
+          <a:prstGeom prst="rect">
+            <a:avLst/>
+          </a:prstGeom>
+          <a:noFill/>
+        </p:spPr>
+        <p:txBody>
+          <a:bodyPr wrap="none" lIns="91440" tIns="45720" rIns="91440" bIns="45720">
+            <a:spAutoFit/>
+          </a:bodyPr>
+          <a:lstStyle/>
+          <a:p>
+            <a:r>
+              <a:rPr lang="en-US" altLang="zh-TW" sz="1050" b="0" cap="none" spc="0" dirty="0">
+                <a:ln w="0"/>
+                <a:solidFill>
+                  <a:schemeClr val="bg2"/>
+                </a:solidFill>
+                <a:effectLst>
+                  <a:outerShdw blurRad="38100" dist="19050" dir="2700000" algn="tl" rotWithShape="0">
+                    <a:schemeClr val="dk1">
+                      <a:alpha val="40000"/>
+                    </a:schemeClr>
+                  </a:outerShdw>
+                </a:effectLst>
+                <a:latin typeface="Consolas" panose="020B0609020204030204" pitchFamily="49" charset="0"/>
+              </a:rPr>
+              <a:t>Set Height and Width</a:t>
+            </a:r>
+            <a:endParaRPr lang="zh-TW" altLang="en-US" sz="1050" b="0" cap="none" spc="0" dirty="0">
+              <a:ln w="0"/>
+              <a:solidFill>
+                <a:schemeClr val="bg2"/>
+              </a:solidFill>
+              <a:effectLst>
+                <a:outerShdw blurRad="38100" dist="19050" dir="2700000" algn="tl" rotWithShape="0">
+                  <a:schemeClr val="dk1">
+                    <a:alpha val="40000"/>
+                  </a:schemeClr>
+                </a:outerShdw>
+              </a:effectLst>
+              <a:latin typeface="Consolas" panose="020B0609020204030204" pitchFamily="49" charset="0"/>
+            </a:endParaRPr>
+          </a:p>
+        </p:txBody>
+      </p:sp>
+      <p:sp>
+        <p:nvSpPr>
+          <p:cNvPr id="11" name="矩形 10">
+            <a:extLst>
+              <a:ext uri="{FF2B5EF4-FFF2-40B4-BE49-F238E27FC236}">
+                <a16:creationId xmlns:a16="http://schemas.microsoft.com/office/drawing/2014/main" id="{DEB31FDD-4A9B-1042-37AF-7EA7D204DB24}"/>
+              </a:ext>
+            </a:extLst>
+          </p:cNvPr>
+          <p:cNvSpPr/>
+          <p:nvPr/>
+        </p:nvSpPr>
+        <p:spPr>
+          <a:xfrm>
+            <a:off x="2788238" y="-1702575"/>
+            <a:ext cx="5059680" cy="467906"/>
+          </a:xfrm>
+          <a:prstGeom prst="rect">
+            <a:avLst/>
+          </a:prstGeom>
+          <a:solidFill>
+            <a:schemeClr val="bg1">
+              <a:alpha val="8000"/>
+            </a:schemeClr>
+          </a:solidFill>
+          <a:ln>
+            <a:solidFill>
+              <a:schemeClr val="bg1">
+                <a:alpha val="25000"/>
+              </a:schemeClr>
+            </a:solidFill>
+          </a:ln>
+        </p:spPr>
+        <p:style>
+          <a:lnRef idx="2">
+            <a:schemeClr val="accent1">
+              <a:shade val="50000"/>
+            </a:schemeClr>
+          </a:lnRef>
+          <a:fillRef idx="1">
+            <a:schemeClr val="accent1"/>
+          </a:fillRef>
+          <a:effectRef idx="0">
+            <a:schemeClr val="accent1"/>
+          </a:effectRef>
+          <a:fontRef idx="minor">
+            <a:schemeClr val="lt1"/>
+          </a:fontRef>
+        </p:style>
+        <p:txBody>
+          <a:bodyPr rtlCol="0" anchor="ctr"/>
+          <a:lstStyle/>
+          <a:p>
+            <a:pPr algn="ctr"/>
+            <a:endParaRPr lang="zh-TW" altLang="en-US"/>
+          </a:p>
+        </p:txBody>
+      </p:sp>
+      <p:sp>
+        <p:nvSpPr>
+          <p:cNvPr id="13" name="矩形 12">
+            <a:extLst>
+              <a:ext uri="{FF2B5EF4-FFF2-40B4-BE49-F238E27FC236}">
+                <a16:creationId xmlns:a16="http://schemas.microsoft.com/office/drawing/2014/main" id="{50EA8804-5D73-47A6-88F7-5B96F6CEEE49}"/>
+              </a:ext>
+            </a:extLst>
+          </p:cNvPr>
+          <p:cNvSpPr/>
+          <p:nvPr/>
+        </p:nvSpPr>
+        <p:spPr>
+          <a:xfrm>
+            <a:off x="7802198" y="-1741662"/>
+            <a:ext cx="1880643" cy="253916"/>
+          </a:xfrm>
+          <a:prstGeom prst="rect">
+            <a:avLst/>
+          </a:prstGeom>
+          <a:noFill/>
+        </p:spPr>
+        <p:txBody>
+          <a:bodyPr wrap="none" lIns="91440" tIns="45720" rIns="91440" bIns="45720">
+            <a:spAutoFit/>
+          </a:bodyPr>
+          <a:lstStyle/>
+          <a:p>
+            <a:r>
+              <a:rPr lang="en-US" altLang="zh-TW" sz="1050" b="0" cap="none" spc="0" dirty="0">
+                <a:ln w="0"/>
+                <a:solidFill>
+                  <a:schemeClr val="bg2"/>
+                </a:solidFill>
+                <a:effectLst>
+                  <a:outerShdw blurRad="38100" dist="19050" dir="2700000" algn="tl" rotWithShape="0">
+                    <a:schemeClr val="dk1">
+                      <a:alpha val="40000"/>
+                    </a:schemeClr>
+                  </a:outerShdw>
+                </a:effectLst>
+                <a:latin typeface="Consolas" panose="020B0609020204030204" pitchFamily="49" charset="0"/>
+              </a:rPr>
+              <a:t>Set text for box layout</a:t>
+            </a:r>
+            <a:endParaRPr lang="zh-TW" altLang="en-US" sz="1050" b="0" cap="none" spc="0" dirty="0">
+              <a:ln w="0"/>
+              <a:solidFill>
+                <a:schemeClr val="bg2"/>
+              </a:solidFill>
+              <a:effectLst>
+                <a:outerShdw blurRad="38100" dist="19050" dir="2700000" algn="tl" rotWithShape="0">
+                  <a:schemeClr val="dk1">
+                    <a:alpha val="40000"/>
+                  </a:schemeClr>
+                </a:outerShdw>
+              </a:effectLst>
+              <a:latin typeface="Consolas" panose="020B0609020204030204" pitchFamily="49" charset="0"/>
+            </a:endParaRPr>
+          </a:p>
+        </p:txBody>
+      </p:sp>
+      <p:sp>
+        <p:nvSpPr>
+          <p:cNvPr id="14" name="矩形 13">
+            <a:extLst>
+              <a:ext uri="{FF2B5EF4-FFF2-40B4-BE49-F238E27FC236}">
+                <a16:creationId xmlns:a16="http://schemas.microsoft.com/office/drawing/2014/main" id="{102D5B6D-F3E0-28CE-A4A0-AEBD9C506B55}"/>
+              </a:ext>
+            </a:extLst>
+          </p:cNvPr>
+          <p:cNvSpPr/>
+          <p:nvPr/>
+        </p:nvSpPr>
+        <p:spPr>
+          <a:xfrm>
+            <a:off x="2788238" y="-1121000"/>
+            <a:ext cx="5059680" cy="843667"/>
+          </a:xfrm>
+          <a:prstGeom prst="rect">
+            <a:avLst/>
+          </a:prstGeom>
+          <a:solidFill>
+            <a:schemeClr val="bg1">
+              <a:alpha val="8000"/>
+            </a:schemeClr>
+          </a:solidFill>
+          <a:ln>
+            <a:solidFill>
+              <a:schemeClr val="bg1">
+                <a:alpha val="25000"/>
+              </a:schemeClr>
+            </a:solidFill>
+          </a:ln>
+        </p:spPr>
+        <p:style>
+          <a:lnRef idx="2">
+            <a:schemeClr val="accent1">
+              <a:shade val="50000"/>
+            </a:schemeClr>
+          </a:lnRef>
+          <a:fillRef idx="1">
+            <a:schemeClr val="accent1"/>
+          </a:fillRef>
+          <a:effectRef idx="0">
+            <a:schemeClr val="accent1"/>
+          </a:effectRef>
+          <a:fontRef idx="minor">
+            <a:schemeClr val="lt1"/>
+          </a:fontRef>
+        </p:style>
+        <p:txBody>
+          <a:bodyPr rtlCol="0" anchor="ctr"/>
+          <a:lstStyle/>
+          <a:p>
+            <a:pPr algn="ctr"/>
+            <a:endParaRPr lang="zh-TW" altLang="en-US"/>
+          </a:p>
+        </p:txBody>
+      </p:sp>
+      <p:sp>
+        <p:nvSpPr>
+          <p:cNvPr id="15" name="矩形 14">
+            <a:extLst>
+              <a:ext uri="{FF2B5EF4-FFF2-40B4-BE49-F238E27FC236}">
+                <a16:creationId xmlns:a16="http://schemas.microsoft.com/office/drawing/2014/main" id="{CC516375-5422-D395-16A3-26E9FE8452AE}"/>
+              </a:ext>
+            </a:extLst>
+          </p:cNvPr>
+          <p:cNvSpPr/>
+          <p:nvPr/>
+        </p:nvSpPr>
+        <p:spPr>
+          <a:xfrm>
+            <a:off x="7802198" y="-1153116"/>
+            <a:ext cx="1733167" cy="415498"/>
+          </a:xfrm>
+          <a:prstGeom prst="rect">
+            <a:avLst/>
+          </a:prstGeom>
+          <a:noFill/>
+        </p:spPr>
+        <p:txBody>
+          <a:bodyPr wrap="none" lIns="91440" tIns="45720" rIns="91440" bIns="45720">
+            <a:spAutoFit/>
+          </a:bodyPr>
+          <a:lstStyle/>
+          <a:p>
+            <a:r>
+              <a:rPr lang="en-US" altLang="zh-TW" sz="1050" b="0" cap="none" spc="0" dirty="0">
+                <a:ln w="0"/>
+                <a:solidFill>
+                  <a:schemeClr val="bg2"/>
+                </a:solidFill>
+                <a:effectLst>
+                  <a:outerShdw blurRad="38100" dist="19050" dir="2700000" algn="tl" rotWithShape="0">
+                    <a:schemeClr val="dk1">
+                      <a:alpha val="40000"/>
+                    </a:schemeClr>
+                  </a:outerShdw>
+                </a:effectLst>
+                <a:latin typeface="Consolas" panose="020B0609020204030204" pitchFamily="49" charset="0"/>
+              </a:rPr>
+              <a:t>Define parameter for </a:t>
+            </a:r>
+          </a:p>
+          <a:p>
+            <a:r>
+              <a:rPr lang="en-US" altLang="zh-TW" sz="1050" b="0" cap="none" spc="0" dirty="0">
+                <a:ln w="0"/>
+                <a:solidFill>
+                  <a:schemeClr val="bg2"/>
+                </a:solidFill>
+                <a:effectLst>
+                  <a:outerShdw blurRad="38100" dist="19050" dir="2700000" algn="tl" rotWithShape="0">
+                    <a:schemeClr val="dk1">
+                      <a:alpha val="40000"/>
+                    </a:schemeClr>
+                  </a:outerShdw>
+                </a:effectLst>
+                <a:latin typeface="Consolas" panose="020B0609020204030204" pitchFamily="49" charset="0"/>
+              </a:rPr>
+              <a:t>methods</a:t>
+            </a:r>
+            <a:endParaRPr lang="zh-TW" altLang="en-US" sz="1050" b="0" cap="none" spc="0" dirty="0">
+              <a:ln w="0"/>
+              <a:solidFill>
+                <a:schemeClr val="bg2"/>
+              </a:solidFill>
+              <a:effectLst>
+                <a:outerShdw blurRad="38100" dist="19050" dir="2700000" algn="tl" rotWithShape="0">
+                  <a:schemeClr val="dk1">
+                    <a:alpha val="40000"/>
+                  </a:schemeClr>
+                </a:outerShdw>
+              </a:effectLst>
+              <a:latin typeface="Consolas" panose="020B0609020204030204" pitchFamily="49" charset="0"/>
+            </a:endParaRPr>
+          </a:p>
+        </p:txBody>
+      </p:sp>
+      <p:sp>
+        <p:nvSpPr>
+          <p:cNvPr id="16" name="矩形 15">
+            <a:extLst>
+              <a:ext uri="{FF2B5EF4-FFF2-40B4-BE49-F238E27FC236}">
+                <a16:creationId xmlns:a16="http://schemas.microsoft.com/office/drawing/2014/main" id="{6C4598DA-22E3-456B-2D62-80C0E9726913}"/>
+              </a:ext>
+            </a:extLst>
+          </p:cNvPr>
+          <p:cNvSpPr/>
+          <p:nvPr/>
+        </p:nvSpPr>
+        <p:spPr>
+          <a:xfrm>
+            <a:off x="2788238" y="-236449"/>
+            <a:ext cx="5059680" cy="460286"/>
+          </a:xfrm>
+          <a:prstGeom prst="rect">
+            <a:avLst/>
+          </a:prstGeom>
+          <a:solidFill>
+            <a:schemeClr val="bg1">
+              <a:alpha val="8000"/>
+            </a:schemeClr>
+          </a:solidFill>
+          <a:ln>
+            <a:solidFill>
+              <a:schemeClr val="bg1">
+                <a:alpha val="25000"/>
+              </a:schemeClr>
+            </a:solidFill>
+          </a:ln>
+        </p:spPr>
+        <p:style>
+          <a:lnRef idx="2">
+            <a:schemeClr val="accent1">
+              <a:shade val="50000"/>
+            </a:schemeClr>
+          </a:lnRef>
+          <a:fillRef idx="1">
+            <a:schemeClr val="accent1"/>
+          </a:fillRef>
+          <a:effectRef idx="0">
+            <a:schemeClr val="accent1"/>
+          </a:effectRef>
+          <a:fontRef idx="minor">
+            <a:schemeClr val="lt1"/>
+          </a:fontRef>
+        </p:style>
+        <p:txBody>
+          <a:bodyPr rtlCol="0" anchor="ctr"/>
+          <a:lstStyle/>
+          <a:p>
+            <a:pPr algn="ctr"/>
+            <a:endParaRPr lang="zh-TW" altLang="en-US"/>
+          </a:p>
+        </p:txBody>
+      </p:sp>
+      <p:sp>
+        <p:nvSpPr>
+          <p:cNvPr id="17" name="矩形 16">
+            <a:extLst>
+              <a:ext uri="{FF2B5EF4-FFF2-40B4-BE49-F238E27FC236}">
+                <a16:creationId xmlns:a16="http://schemas.microsoft.com/office/drawing/2014/main" id="{DA90ADC3-7DED-796E-C981-0FA9492557F5}"/>
+              </a:ext>
+            </a:extLst>
+          </p:cNvPr>
+          <p:cNvSpPr/>
+          <p:nvPr/>
+        </p:nvSpPr>
+        <p:spPr>
+          <a:xfrm>
+            <a:off x="7802198" y="-300193"/>
+            <a:ext cx="1659429" cy="253916"/>
+          </a:xfrm>
+          <a:prstGeom prst="rect">
+            <a:avLst/>
+          </a:prstGeom>
+          <a:noFill/>
+        </p:spPr>
+        <p:txBody>
+          <a:bodyPr wrap="none" lIns="91440" tIns="45720" rIns="91440" bIns="45720">
+            <a:spAutoFit/>
+          </a:bodyPr>
+          <a:lstStyle/>
+          <a:p>
+            <a:r>
+              <a:rPr lang="en-US" altLang="zh-TW" sz="1050" b="0" cap="none" spc="0" dirty="0">
+                <a:ln w="0"/>
+                <a:solidFill>
+                  <a:schemeClr val="bg2"/>
+                </a:solidFill>
+                <a:effectLst>
+                  <a:outerShdw blurRad="38100" dist="19050" dir="2700000" algn="tl" rotWithShape="0">
+                    <a:schemeClr val="dk1">
+                      <a:alpha val="40000"/>
+                    </a:schemeClr>
+                  </a:outerShdw>
+                </a:effectLst>
+                <a:latin typeface="Consolas" panose="020B0609020204030204" pitchFamily="49" charset="0"/>
+              </a:rPr>
+              <a:t>Set Color attributes</a:t>
+            </a:r>
+            <a:endParaRPr lang="zh-TW" altLang="en-US" sz="1050" b="0" cap="none" spc="0" dirty="0">
+              <a:ln w="0"/>
+              <a:solidFill>
+                <a:schemeClr val="bg2"/>
+              </a:solidFill>
+              <a:effectLst>
+                <a:outerShdw blurRad="38100" dist="19050" dir="2700000" algn="tl" rotWithShape="0">
+                  <a:schemeClr val="dk1">
+                    <a:alpha val="40000"/>
+                  </a:schemeClr>
+                </a:outerShdw>
+              </a:effectLst>
+              <a:latin typeface="Consolas" panose="020B0609020204030204" pitchFamily="49" charset="0"/>
+            </a:endParaRPr>
+          </a:p>
+        </p:txBody>
+      </p:sp>
+      <p:sp>
+        <p:nvSpPr>
+          <p:cNvPr id="18" name="矩形 17">
+            <a:extLst>
+              <a:ext uri="{FF2B5EF4-FFF2-40B4-BE49-F238E27FC236}">
+                <a16:creationId xmlns:a16="http://schemas.microsoft.com/office/drawing/2014/main" id="{416A56B3-449C-F343-CE1F-8DE9BF2233EF}"/>
+              </a:ext>
+            </a:extLst>
+          </p:cNvPr>
+          <p:cNvSpPr/>
+          <p:nvPr/>
+        </p:nvSpPr>
+        <p:spPr>
+          <a:xfrm>
+            <a:off x="2788238" y="782531"/>
+            <a:ext cx="5059680" cy="253560"/>
+          </a:xfrm>
+          <a:prstGeom prst="rect">
+            <a:avLst/>
+          </a:prstGeom>
+          <a:solidFill>
+            <a:schemeClr val="bg1">
+              <a:alpha val="8000"/>
+            </a:schemeClr>
+          </a:solidFill>
+          <a:ln>
+            <a:solidFill>
+              <a:schemeClr val="bg1">
+                <a:alpha val="25000"/>
+              </a:schemeClr>
+            </a:solidFill>
+          </a:ln>
+        </p:spPr>
+        <p:style>
+          <a:lnRef idx="2">
+            <a:schemeClr val="accent1">
+              <a:shade val="50000"/>
+            </a:schemeClr>
+          </a:lnRef>
+          <a:fillRef idx="1">
+            <a:schemeClr val="accent1"/>
+          </a:fillRef>
+          <a:effectRef idx="0">
+            <a:schemeClr val="accent1"/>
+          </a:effectRef>
+          <a:fontRef idx="minor">
+            <a:schemeClr val="lt1"/>
+          </a:fontRef>
+        </p:style>
+        <p:txBody>
+          <a:bodyPr rtlCol="0" anchor="ctr"/>
+          <a:lstStyle/>
+          <a:p>
+            <a:pPr algn="ctr"/>
+            <a:endParaRPr lang="zh-TW" altLang="en-US"/>
+          </a:p>
+        </p:txBody>
+      </p:sp>
+      <p:sp>
+        <p:nvSpPr>
+          <p:cNvPr id="19" name="矩形 18">
+            <a:extLst>
+              <a:ext uri="{FF2B5EF4-FFF2-40B4-BE49-F238E27FC236}">
+                <a16:creationId xmlns:a16="http://schemas.microsoft.com/office/drawing/2014/main" id="{553FB564-A3B7-262D-121A-47DF1C76633B}"/>
+              </a:ext>
+            </a:extLst>
+          </p:cNvPr>
+          <p:cNvSpPr/>
+          <p:nvPr/>
+        </p:nvSpPr>
+        <p:spPr>
+          <a:xfrm>
+            <a:off x="7802198" y="782175"/>
+            <a:ext cx="922047" cy="253916"/>
+          </a:xfrm>
+          <a:prstGeom prst="rect">
+            <a:avLst/>
+          </a:prstGeom>
+          <a:noFill/>
+        </p:spPr>
+        <p:txBody>
+          <a:bodyPr wrap="none" lIns="91440" tIns="45720" rIns="91440" bIns="45720">
+            <a:spAutoFit/>
+          </a:bodyPr>
+          <a:lstStyle/>
+          <a:p>
+            <a:r>
+              <a:rPr lang="en-US" altLang="zh-TW" sz="1050" b="0" cap="none" spc="0" dirty="0">
+                <a:ln w="0"/>
+                <a:solidFill>
+                  <a:schemeClr val="bg2"/>
+                </a:solidFill>
+                <a:effectLst>
+                  <a:outerShdw blurRad="38100" dist="19050" dir="2700000" algn="tl" rotWithShape="0">
+                    <a:schemeClr val="dk1">
+                      <a:alpha val="40000"/>
+                    </a:schemeClr>
+                  </a:outerShdw>
+                </a:effectLst>
+                <a:latin typeface="Consolas" panose="020B0609020204030204" pitchFamily="49" charset="0"/>
+              </a:rPr>
+              <a:t>Get Handle</a:t>
+            </a:r>
+            <a:endParaRPr lang="zh-TW" altLang="en-US" sz="1050" b="0" cap="none" spc="0" dirty="0">
+              <a:ln w="0"/>
+              <a:solidFill>
+                <a:schemeClr val="bg2"/>
+              </a:solidFill>
+              <a:effectLst>
+                <a:outerShdw blurRad="38100" dist="19050" dir="2700000" algn="tl" rotWithShape="0">
+                  <a:schemeClr val="dk1">
+                    <a:alpha val="40000"/>
+                  </a:schemeClr>
+                </a:outerShdw>
+              </a:effectLst>
+              <a:latin typeface="Consolas" panose="020B0609020204030204" pitchFamily="49" charset="0"/>
+            </a:endParaRPr>
+          </a:p>
+        </p:txBody>
+      </p:sp>
+      <p:sp>
+        <p:nvSpPr>
+          <p:cNvPr id="20" name="矩形 19">
+            <a:extLst>
+              <a:ext uri="{FF2B5EF4-FFF2-40B4-BE49-F238E27FC236}">
+                <a16:creationId xmlns:a16="http://schemas.microsoft.com/office/drawing/2014/main" id="{F975DE6E-2869-7970-DF4D-4D3293ABC6B0}"/>
+              </a:ext>
+            </a:extLst>
+          </p:cNvPr>
+          <p:cNvSpPr/>
+          <p:nvPr/>
+        </p:nvSpPr>
+        <p:spPr>
+          <a:xfrm>
+            <a:off x="2788238" y="1293554"/>
+            <a:ext cx="5059680" cy="1963043"/>
+          </a:xfrm>
+          <a:prstGeom prst="rect">
+            <a:avLst/>
+          </a:prstGeom>
+          <a:solidFill>
+            <a:schemeClr val="accent5">
+              <a:lumMod val="40000"/>
+              <a:lumOff val="60000"/>
+              <a:alpha val="8000"/>
+            </a:schemeClr>
+          </a:solidFill>
+          <a:ln>
+            <a:solidFill>
+              <a:schemeClr val="accent5">
+                <a:lumMod val="40000"/>
+                <a:lumOff val="60000"/>
+                <a:alpha val="25000"/>
+              </a:schemeClr>
+            </a:solidFill>
+          </a:ln>
+        </p:spPr>
+        <p:style>
+          <a:lnRef idx="2">
+            <a:schemeClr val="accent1">
+              <a:shade val="50000"/>
+            </a:schemeClr>
+          </a:lnRef>
+          <a:fillRef idx="1">
+            <a:schemeClr val="accent1"/>
+          </a:fillRef>
+          <a:effectRef idx="0">
+            <a:schemeClr val="accent1"/>
+          </a:effectRef>
+          <a:fontRef idx="minor">
+            <a:schemeClr val="lt1"/>
+          </a:fontRef>
+        </p:style>
+        <p:txBody>
+          <a:bodyPr rtlCol="0" anchor="ctr"/>
+          <a:lstStyle/>
+          <a:p>
+            <a:pPr algn="ctr"/>
+            <a:endParaRPr lang="zh-TW" altLang="en-US"/>
+          </a:p>
+        </p:txBody>
+      </p:sp>
+      <p:sp>
+        <p:nvSpPr>
+          <p:cNvPr id="21" name="矩形 20">
+            <a:extLst>
+              <a:ext uri="{FF2B5EF4-FFF2-40B4-BE49-F238E27FC236}">
+                <a16:creationId xmlns:a16="http://schemas.microsoft.com/office/drawing/2014/main" id="{C9FC6600-D9F8-B227-7746-F2C92289080A}"/>
+              </a:ext>
+            </a:extLst>
+          </p:cNvPr>
+          <p:cNvSpPr/>
+          <p:nvPr/>
+        </p:nvSpPr>
+        <p:spPr>
+          <a:xfrm>
+            <a:off x="7802198" y="1293554"/>
+            <a:ext cx="700833" cy="253916"/>
+          </a:xfrm>
+          <a:prstGeom prst="rect">
+            <a:avLst/>
+          </a:prstGeom>
+          <a:noFill/>
+        </p:spPr>
+        <p:txBody>
+          <a:bodyPr wrap="none" lIns="91440" tIns="45720" rIns="91440" bIns="45720">
+            <a:spAutoFit/>
+          </a:bodyPr>
+          <a:lstStyle/>
+          <a:p>
+            <a:r>
+              <a:rPr lang="en-US" altLang="zh-TW" sz="1050" b="0" cap="none" spc="0" dirty="0">
+                <a:ln w="0"/>
+                <a:solidFill>
+                  <a:schemeClr val="bg2"/>
+                </a:solidFill>
+                <a:effectLst>
+                  <a:outerShdw blurRad="38100" dist="19050" dir="2700000" algn="tl" rotWithShape="0">
+                    <a:schemeClr val="dk1">
+                      <a:alpha val="40000"/>
+                    </a:schemeClr>
+                  </a:outerShdw>
+                </a:effectLst>
+                <a:latin typeface="Consolas" panose="020B0609020204030204" pitchFamily="49" charset="0"/>
+              </a:rPr>
+              <a:t>Box Top</a:t>
+            </a:r>
+            <a:endParaRPr lang="zh-TW" altLang="en-US" sz="1050" b="0" cap="none" spc="0" dirty="0">
+              <a:ln w="0"/>
+              <a:solidFill>
+                <a:schemeClr val="bg2"/>
+              </a:solidFill>
+              <a:effectLst>
+                <a:outerShdw blurRad="38100" dist="19050" dir="2700000" algn="tl" rotWithShape="0">
+                  <a:schemeClr val="dk1">
+                    <a:alpha val="40000"/>
+                  </a:schemeClr>
+                </a:outerShdw>
+              </a:effectLst>
+              <a:latin typeface="Consolas" panose="020B0609020204030204" pitchFamily="49" charset="0"/>
+            </a:endParaRPr>
+          </a:p>
+        </p:txBody>
+      </p:sp>
+      <p:sp>
+        <p:nvSpPr>
+          <p:cNvPr id="24" name="矩形 23">
+            <a:extLst>
+              <a:ext uri="{FF2B5EF4-FFF2-40B4-BE49-F238E27FC236}">
+                <a16:creationId xmlns:a16="http://schemas.microsoft.com/office/drawing/2014/main" id="{D682BC79-ECD8-66A6-EA76-6ED51DA2E19F}"/>
+              </a:ext>
+            </a:extLst>
+          </p:cNvPr>
+          <p:cNvSpPr/>
+          <p:nvPr/>
+        </p:nvSpPr>
+        <p:spPr>
+          <a:xfrm>
+            <a:off x="2871107" y="1454422"/>
+            <a:ext cx="4876799" cy="838970"/>
+          </a:xfrm>
+          <a:prstGeom prst="rect">
+            <a:avLst/>
+          </a:prstGeom>
+          <a:solidFill>
+            <a:schemeClr val="accent5">
+              <a:lumMod val="40000"/>
+              <a:lumOff val="60000"/>
+              <a:alpha val="8000"/>
+            </a:schemeClr>
+          </a:solidFill>
+          <a:ln>
+            <a:solidFill>
+              <a:schemeClr val="accent5">
+                <a:lumMod val="40000"/>
+                <a:lumOff val="60000"/>
+                <a:alpha val="25000"/>
+              </a:schemeClr>
+            </a:solidFill>
+          </a:ln>
+        </p:spPr>
+        <p:style>
+          <a:lnRef idx="2">
+            <a:schemeClr val="accent1">
+              <a:shade val="50000"/>
+            </a:schemeClr>
+          </a:lnRef>
+          <a:fillRef idx="1">
+            <a:schemeClr val="accent1"/>
+          </a:fillRef>
+          <a:effectRef idx="0">
+            <a:schemeClr val="accent1"/>
+          </a:effectRef>
+          <a:fontRef idx="minor">
+            <a:schemeClr val="lt1"/>
+          </a:fontRef>
+        </p:style>
+        <p:txBody>
+          <a:bodyPr rtlCol="0" anchor="ctr"/>
+          <a:lstStyle/>
+          <a:p>
+            <a:pPr algn="ctr"/>
+            <a:endParaRPr lang="zh-TW" altLang="en-US"/>
+          </a:p>
+        </p:txBody>
+      </p:sp>
+      <p:sp>
+        <p:nvSpPr>
+          <p:cNvPr id="22" name="矩形 21">
+            <a:extLst>
+              <a:ext uri="{FF2B5EF4-FFF2-40B4-BE49-F238E27FC236}">
+                <a16:creationId xmlns:a16="http://schemas.microsoft.com/office/drawing/2014/main" id="{2921E524-C011-F699-2D57-A4F2A420424B}"/>
+              </a:ext>
+            </a:extLst>
+          </p:cNvPr>
+          <p:cNvSpPr/>
+          <p:nvPr/>
+        </p:nvSpPr>
+        <p:spPr>
+          <a:xfrm>
+            <a:off x="6446252" y="1403158"/>
+            <a:ext cx="1069524" cy="253916"/>
+          </a:xfrm>
+          <a:prstGeom prst="rect">
+            <a:avLst/>
+          </a:prstGeom>
+          <a:noFill/>
+        </p:spPr>
+        <p:txBody>
+          <a:bodyPr wrap="none" lIns="91440" tIns="45720" rIns="91440" bIns="45720">
+            <a:spAutoFit/>
+          </a:bodyPr>
+          <a:lstStyle/>
+          <a:p>
+            <a:r>
+              <a:rPr lang="en-US" altLang="zh-TW" sz="1050" b="0" cap="none" spc="0" dirty="0">
+                <a:ln w="0"/>
+                <a:solidFill>
+                  <a:schemeClr val="bg2"/>
+                </a:solidFill>
+                <a:effectLst>
+                  <a:outerShdw blurRad="38100" dist="19050" dir="2700000" algn="tl" rotWithShape="0">
+                    <a:schemeClr val="dk1">
+                      <a:alpha val="40000"/>
+                    </a:schemeClr>
+                  </a:outerShdw>
+                </a:effectLst>
+                <a:latin typeface="Consolas" panose="020B0609020204030204" pitchFamily="49" charset="0"/>
+              </a:rPr>
+              <a:t>Change Color</a:t>
+            </a:r>
+            <a:endParaRPr lang="zh-TW" altLang="en-US" sz="1050" b="0" cap="none" spc="0" dirty="0">
+              <a:ln w="0"/>
+              <a:solidFill>
+                <a:schemeClr val="bg2"/>
+              </a:solidFill>
+              <a:effectLst>
+                <a:outerShdw blurRad="38100" dist="19050" dir="2700000" algn="tl" rotWithShape="0">
+                  <a:schemeClr val="dk1">
+                    <a:alpha val="40000"/>
+                  </a:schemeClr>
+                </a:outerShdw>
+              </a:effectLst>
+              <a:latin typeface="Consolas" panose="020B0609020204030204" pitchFamily="49" charset="0"/>
+            </a:endParaRPr>
+          </a:p>
+        </p:txBody>
+      </p:sp>
+      <p:sp>
+        <p:nvSpPr>
+          <p:cNvPr id="25" name="矩形 24">
+            <a:extLst>
+              <a:ext uri="{FF2B5EF4-FFF2-40B4-BE49-F238E27FC236}">
+                <a16:creationId xmlns:a16="http://schemas.microsoft.com/office/drawing/2014/main" id="{126F69DA-023D-D550-C876-BDE64FCC80A8}"/>
+              </a:ext>
+            </a:extLst>
+          </p:cNvPr>
+          <p:cNvSpPr/>
+          <p:nvPr/>
+        </p:nvSpPr>
+        <p:spPr>
+          <a:xfrm>
+            <a:off x="2871107" y="2387147"/>
+            <a:ext cx="4876799" cy="838970"/>
+          </a:xfrm>
+          <a:prstGeom prst="rect">
+            <a:avLst/>
+          </a:prstGeom>
+          <a:solidFill>
+            <a:schemeClr val="accent5">
+              <a:lumMod val="40000"/>
+              <a:lumOff val="60000"/>
+              <a:alpha val="8000"/>
+            </a:schemeClr>
+          </a:solidFill>
+          <a:ln>
+            <a:solidFill>
+              <a:schemeClr val="accent5">
+                <a:lumMod val="40000"/>
+                <a:lumOff val="60000"/>
+                <a:alpha val="25000"/>
+              </a:schemeClr>
+            </a:solidFill>
+          </a:ln>
+        </p:spPr>
+        <p:style>
+          <a:lnRef idx="2">
+            <a:schemeClr val="accent1">
+              <a:shade val="50000"/>
+            </a:schemeClr>
+          </a:lnRef>
+          <a:fillRef idx="1">
+            <a:schemeClr val="accent1"/>
+          </a:fillRef>
+          <a:effectRef idx="0">
+            <a:schemeClr val="accent1"/>
+          </a:effectRef>
+          <a:fontRef idx="minor">
+            <a:schemeClr val="lt1"/>
+          </a:fontRef>
+        </p:style>
+        <p:txBody>
+          <a:bodyPr rtlCol="0" anchor="ctr"/>
+          <a:lstStyle/>
+          <a:p>
+            <a:pPr algn="ctr"/>
+            <a:endParaRPr lang="zh-TW" altLang="en-US"/>
+          </a:p>
+        </p:txBody>
+      </p:sp>
+      <p:sp>
+        <p:nvSpPr>
+          <p:cNvPr id="23" name="矩形 22">
+            <a:extLst>
+              <a:ext uri="{FF2B5EF4-FFF2-40B4-BE49-F238E27FC236}">
+                <a16:creationId xmlns:a16="http://schemas.microsoft.com/office/drawing/2014/main" id="{7A38870D-668B-39EC-4B88-F1A2EB82DCB7}"/>
+              </a:ext>
+            </a:extLst>
+          </p:cNvPr>
+          <p:cNvSpPr/>
+          <p:nvPr/>
+        </p:nvSpPr>
+        <p:spPr>
+          <a:xfrm>
+            <a:off x="6446252" y="2348880"/>
+            <a:ext cx="922047" cy="253916"/>
+          </a:xfrm>
+          <a:prstGeom prst="rect">
+            <a:avLst/>
+          </a:prstGeom>
+          <a:noFill/>
+        </p:spPr>
+        <p:txBody>
+          <a:bodyPr wrap="none" lIns="91440" tIns="45720" rIns="91440" bIns="45720">
+            <a:spAutoFit/>
+          </a:bodyPr>
+          <a:lstStyle/>
+          <a:p>
+            <a:r>
+              <a:rPr lang="en-US" altLang="zh-TW" sz="1050" b="0" cap="none" spc="0" dirty="0">
+                <a:ln w="0"/>
+                <a:solidFill>
+                  <a:schemeClr val="bg2"/>
+                </a:solidFill>
+                <a:effectLst>
+                  <a:outerShdw blurRad="38100" dist="19050" dir="2700000" algn="tl" rotWithShape="0">
+                    <a:schemeClr val="dk1">
+                      <a:alpha val="40000"/>
+                    </a:schemeClr>
+                  </a:outerShdw>
+                </a:effectLst>
+                <a:latin typeface="Consolas" panose="020B0609020204030204" pitchFamily="49" charset="0"/>
+              </a:rPr>
+              <a:t>Print Char</a:t>
+            </a:r>
+            <a:endParaRPr lang="zh-TW" altLang="en-US" sz="1050" b="0" cap="none" spc="0" dirty="0">
+              <a:ln w="0"/>
+              <a:solidFill>
+                <a:schemeClr val="bg2"/>
+              </a:solidFill>
+              <a:effectLst>
+                <a:outerShdw blurRad="38100" dist="19050" dir="2700000" algn="tl" rotWithShape="0">
+                  <a:schemeClr val="dk1">
+                    <a:alpha val="40000"/>
+                  </a:schemeClr>
+                </a:outerShdw>
+              </a:effectLst>
+              <a:latin typeface="Consolas" panose="020B0609020204030204" pitchFamily="49" charset="0"/>
+            </a:endParaRPr>
+          </a:p>
+        </p:txBody>
+      </p:sp>
+      <p:sp>
+        <p:nvSpPr>
+          <p:cNvPr id="26" name="矩形 25">
+            <a:extLst>
+              <a:ext uri="{FF2B5EF4-FFF2-40B4-BE49-F238E27FC236}">
+                <a16:creationId xmlns:a16="http://schemas.microsoft.com/office/drawing/2014/main" id="{26E0E5AA-AF5A-282E-5D63-567DF460A81A}"/>
+              </a:ext>
+            </a:extLst>
+          </p:cNvPr>
+          <p:cNvSpPr/>
+          <p:nvPr/>
+        </p:nvSpPr>
+        <p:spPr>
+          <a:xfrm>
+            <a:off x="2788238" y="3338973"/>
+            <a:ext cx="5059680" cy="3038014"/>
+          </a:xfrm>
+          <a:prstGeom prst="rect">
+            <a:avLst/>
+          </a:prstGeom>
+          <a:solidFill>
+            <a:schemeClr val="accent2">
+              <a:lumMod val="40000"/>
+              <a:lumOff val="60000"/>
+              <a:alpha val="8000"/>
+            </a:schemeClr>
+          </a:solidFill>
+          <a:ln>
+            <a:solidFill>
+              <a:schemeClr val="accent2">
+                <a:lumMod val="40000"/>
+                <a:lumOff val="60000"/>
+                <a:alpha val="25000"/>
+              </a:schemeClr>
+            </a:solidFill>
+          </a:ln>
+        </p:spPr>
+        <p:style>
+          <a:lnRef idx="2">
+            <a:schemeClr val="accent1">
+              <a:shade val="50000"/>
+            </a:schemeClr>
+          </a:lnRef>
+          <a:fillRef idx="1">
+            <a:schemeClr val="accent1"/>
+          </a:fillRef>
+          <a:effectRef idx="0">
+            <a:schemeClr val="accent1"/>
+          </a:effectRef>
+          <a:fontRef idx="minor">
+            <a:schemeClr val="lt1"/>
+          </a:fontRef>
+        </p:style>
+        <p:txBody>
+          <a:bodyPr rtlCol="0" anchor="ctr"/>
+          <a:lstStyle/>
+          <a:p>
+            <a:pPr algn="ctr"/>
+            <a:endParaRPr lang="zh-TW" altLang="en-US"/>
+          </a:p>
+        </p:txBody>
+      </p:sp>
+      <p:sp>
+        <p:nvSpPr>
+          <p:cNvPr id="27" name="矩形 26">
+            <a:extLst>
+              <a:ext uri="{FF2B5EF4-FFF2-40B4-BE49-F238E27FC236}">
+                <a16:creationId xmlns:a16="http://schemas.microsoft.com/office/drawing/2014/main" id="{F79A131F-4FB6-B521-B2AE-11E037BE442D}"/>
+              </a:ext>
+            </a:extLst>
+          </p:cNvPr>
+          <p:cNvSpPr/>
+          <p:nvPr/>
+        </p:nvSpPr>
+        <p:spPr>
+          <a:xfrm>
+            <a:off x="7802198" y="3331353"/>
+            <a:ext cx="1806905" cy="738664"/>
+          </a:xfrm>
+          <a:prstGeom prst="rect">
+            <a:avLst/>
+          </a:prstGeom>
+          <a:noFill/>
+        </p:spPr>
+        <p:txBody>
+          <a:bodyPr wrap="none" lIns="91440" tIns="45720" rIns="91440" bIns="45720">
+            <a:spAutoFit/>
+          </a:bodyPr>
+          <a:lstStyle/>
+          <a:p>
+            <a:r>
+              <a:rPr lang="en-US" altLang="zh-TW" sz="1050" b="0" cap="none" spc="0" dirty="0">
+                <a:ln w="0"/>
+                <a:solidFill>
+                  <a:schemeClr val="bg2"/>
+                </a:solidFill>
+                <a:effectLst>
+                  <a:outerShdw blurRad="38100" dist="19050" dir="2700000" algn="tl" rotWithShape="0">
+                    <a:schemeClr val="dk1">
+                      <a:alpha val="40000"/>
+                    </a:schemeClr>
+                  </a:outerShdw>
+                </a:effectLst>
+                <a:latin typeface="Consolas" panose="020B0609020204030204" pitchFamily="49" charset="0"/>
+              </a:rPr>
+              <a:t>Box </a:t>
+            </a:r>
+            <a:r>
+              <a:rPr lang="en-US" altLang="zh-TW" sz="1050" dirty="0">
+                <a:ln w="0"/>
+                <a:solidFill>
+                  <a:schemeClr val="bg2"/>
+                </a:solidFill>
+                <a:effectLst>
+                  <a:outerShdw blurRad="38100" dist="19050" dir="2700000" algn="tl" rotWithShape="0">
+                    <a:schemeClr val="dk1">
+                      <a:alpha val="40000"/>
+                    </a:schemeClr>
+                  </a:outerShdw>
+                </a:effectLst>
+                <a:latin typeface="Consolas" panose="020B0609020204030204" pitchFamily="49" charset="0"/>
+              </a:rPr>
+              <a:t>B</a:t>
+            </a:r>
+            <a:r>
+              <a:rPr lang="en-US" altLang="zh-TW" sz="1050" b="0" cap="none" spc="0" dirty="0">
+                <a:ln w="0"/>
+                <a:solidFill>
+                  <a:schemeClr val="bg2"/>
+                </a:solidFill>
+                <a:effectLst>
+                  <a:outerShdw blurRad="38100" dist="19050" dir="2700000" algn="tl" rotWithShape="0">
+                    <a:schemeClr val="dk1">
+                      <a:alpha val="40000"/>
+                    </a:schemeClr>
+                  </a:outerShdw>
+                </a:effectLst>
+                <a:latin typeface="Consolas" panose="020B0609020204030204" pitchFamily="49" charset="0"/>
+              </a:rPr>
+              <a:t>ody</a:t>
+            </a:r>
+          </a:p>
+          <a:p>
+            <a:endParaRPr lang="en-US" altLang="zh-TW" sz="1050" dirty="0">
+              <a:ln w="0"/>
+              <a:solidFill>
+                <a:schemeClr val="bg2"/>
+              </a:solidFill>
+              <a:effectLst>
+                <a:outerShdw blurRad="38100" dist="19050" dir="2700000" algn="tl" rotWithShape="0">
+                  <a:schemeClr val="dk1">
+                    <a:alpha val="40000"/>
+                  </a:schemeClr>
+                </a:outerShdw>
+              </a:effectLst>
+              <a:latin typeface="Consolas" panose="020B0609020204030204" pitchFamily="49" charset="0"/>
+            </a:endParaRPr>
+          </a:p>
+          <a:p>
+            <a:r>
+              <a:rPr lang="en-US" altLang="zh-TW" sz="1050" b="0" cap="none" spc="0" dirty="0">
+                <a:ln w="0"/>
+                <a:solidFill>
+                  <a:schemeClr val="bg2"/>
+                </a:solidFill>
+                <a:effectLst>
+                  <a:outerShdw blurRad="38100" dist="19050" dir="2700000" algn="tl" rotWithShape="0">
+                    <a:schemeClr val="dk1">
+                      <a:alpha val="40000"/>
+                    </a:schemeClr>
+                  </a:outerShdw>
+                </a:effectLst>
+                <a:latin typeface="Consolas" panose="020B0609020204030204" pitchFamily="49" charset="0"/>
+              </a:rPr>
+              <a:t>Here we need loop for </a:t>
+            </a:r>
+          </a:p>
+          <a:p>
+            <a:r>
+              <a:rPr lang="en-US" altLang="zh-TW" sz="1050" b="0" cap="none" spc="0" dirty="0">
+                <a:ln w="0"/>
+                <a:solidFill>
+                  <a:schemeClr val="bg2"/>
+                </a:solidFill>
+                <a:effectLst>
+                  <a:outerShdw blurRad="38100" dist="19050" dir="2700000" algn="tl" rotWithShape="0">
+                    <a:schemeClr val="dk1">
+                      <a:alpha val="40000"/>
+                    </a:schemeClr>
+                  </a:outerShdw>
+                </a:effectLst>
+                <a:latin typeface="Consolas" panose="020B0609020204030204" pitchFamily="49" charset="0"/>
+              </a:rPr>
+              <a:t>body height &gt; 1</a:t>
+            </a:r>
+            <a:endParaRPr lang="zh-TW" altLang="en-US" sz="1050" b="0" cap="none" spc="0" dirty="0">
+              <a:ln w="0"/>
+              <a:solidFill>
+                <a:schemeClr val="bg2"/>
+              </a:solidFill>
+              <a:effectLst>
+                <a:outerShdw blurRad="38100" dist="19050" dir="2700000" algn="tl" rotWithShape="0">
+                  <a:schemeClr val="dk1">
+                    <a:alpha val="40000"/>
+                  </a:schemeClr>
+                </a:outerShdw>
+              </a:effectLst>
+              <a:latin typeface="Consolas" panose="020B0609020204030204" pitchFamily="49" charset="0"/>
+            </a:endParaRPr>
+          </a:p>
+        </p:txBody>
+      </p:sp>
+      <p:sp>
+        <p:nvSpPr>
+          <p:cNvPr id="28" name="矩形 27">
+            <a:extLst>
+              <a:ext uri="{FF2B5EF4-FFF2-40B4-BE49-F238E27FC236}">
+                <a16:creationId xmlns:a16="http://schemas.microsoft.com/office/drawing/2014/main" id="{8D948CC5-76FC-2EAE-A8EC-D03AD3469F51}"/>
+              </a:ext>
+            </a:extLst>
+          </p:cNvPr>
+          <p:cNvSpPr/>
+          <p:nvPr/>
+        </p:nvSpPr>
+        <p:spPr>
+          <a:xfrm>
+            <a:off x="2871107" y="4048268"/>
+            <a:ext cx="4876799" cy="838970"/>
+          </a:xfrm>
+          <a:prstGeom prst="rect">
+            <a:avLst/>
+          </a:prstGeom>
+          <a:solidFill>
+            <a:schemeClr val="accent2">
+              <a:lumMod val="40000"/>
+              <a:lumOff val="60000"/>
+              <a:alpha val="8000"/>
+            </a:schemeClr>
+          </a:solidFill>
+          <a:ln>
+            <a:solidFill>
+              <a:schemeClr val="accent2">
+                <a:lumMod val="40000"/>
+                <a:lumOff val="60000"/>
+                <a:alpha val="25000"/>
+              </a:schemeClr>
+            </a:solidFill>
+          </a:ln>
+        </p:spPr>
+        <p:style>
+          <a:lnRef idx="2">
+            <a:schemeClr val="accent1">
+              <a:shade val="50000"/>
+            </a:schemeClr>
+          </a:lnRef>
+          <a:fillRef idx="1">
+            <a:schemeClr val="accent1"/>
+          </a:fillRef>
+          <a:effectRef idx="0">
+            <a:schemeClr val="accent1"/>
+          </a:effectRef>
+          <a:fontRef idx="minor">
+            <a:schemeClr val="lt1"/>
+          </a:fontRef>
+        </p:style>
+        <p:txBody>
+          <a:bodyPr rtlCol="0" anchor="ctr"/>
+          <a:lstStyle/>
+          <a:p>
+            <a:pPr algn="ctr"/>
+            <a:endParaRPr lang="zh-TW" altLang="en-US"/>
+          </a:p>
+        </p:txBody>
+      </p:sp>
+      <p:sp>
+        <p:nvSpPr>
+          <p:cNvPr id="29" name="矩形 28">
+            <a:extLst>
+              <a:ext uri="{FF2B5EF4-FFF2-40B4-BE49-F238E27FC236}">
+                <a16:creationId xmlns:a16="http://schemas.microsoft.com/office/drawing/2014/main" id="{509447ED-8744-817A-77F6-1161D9022D0F}"/>
+              </a:ext>
+            </a:extLst>
+          </p:cNvPr>
+          <p:cNvSpPr/>
+          <p:nvPr/>
+        </p:nvSpPr>
+        <p:spPr>
+          <a:xfrm>
+            <a:off x="6446252" y="3997004"/>
+            <a:ext cx="1069524" cy="253916"/>
+          </a:xfrm>
+          <a:prstGeom prst="rect">
+            <a:avLst/>
+          </a:prstGeom>
+          <a:noFill/>
+        </p:spPr>
+        <p:txBody>
+          <a:bodyPr wrap="none" lIns="91440" tIns="45720" rIns="91440" bIns="45720">
+            <a:spAutoFit/>
+          </a:bodyPr>
+          <a:lstStyle/>
+          <a:p>
+            <a:r>
+              <a:rPr lang="en-US" altLang="zh-TW" sz="1050" b="0" cap="none" spc="0" dirty="0">
+                <a:ln w="0"/>
+                <a:solidFill>
+                  <a:schemeClr val="bg2"/>
+                </a:solidFill>
+                <a:effectLst>
+                  <a:outerShdw blurRad="38100" dist="19050" dir="2700000" algn="tl" rotWithShape="0">
+                    <a:schemeClr val="dk1">
+                      <a:alpha val="40000"/>
+                    </a:schemeClr>
+                  </a:outerShdw>
+                </a:effectLst>
+                <a:latin typeface="Consolas" panose="020B0609020204030204" pitchFamily="49" charset="0"/>
+              </a:rPr>
+              <a:t>Change Color</a:t>
+            </a:r>
+            <a:endParaRPr lang="zh-TW" altLang="en-US" sz="1050" b="0" cap="none" spc="0" dirty="0">
+              <a:ln w="0"/>
+              <a:solidFill>
+                <a:schemeClr val="bg2"/>
+              </a:solidFill>
+              <a:effectLst>
+                <a:outerShdw blurRad="38100" dist="19050" dir="2700000" algn="tl" rotWithShape="0">
+                  <a:schemeClr val="dk1">
+                    <a:alpha val="40000"/>
+                  </a:schemeClr>
+                </a:outerShdw>
+              </a:effectLst>
+              <a:latin typeface="Consolas" panose="020B0609020204030204" pitchFamily="49" charset="0"/>
+            </a:endParaRPr>
+          </a:p>
+        </p:txBody>
+      </p:sp>
+      <p:sp>
+        <p:nvSpPr>
+          <p:cNvPr id="30" name="矩形 29">
+            <a:extLst>
+              <a:ext uri="{FF2B5EF4-FFF2-40B4-BE49-F238E27FC236}">
+                <a16:creationId xmlns:a16="http://schemas.microsoft.com/office/drawing/2014/main" id="{7FCF0D2A-B0F7-CE62-BF10-56A22526F640}"/>
+              </a:ext>
+            </a:extLst>
+          </p:cNvPr>
+          <p:cNvSpPr/>
+          <p:nvPr/>
+        </p:nvSpPr>
+        <p:spPr>
+          <a:xfrm>
+            <a:off x="2871107" y="4992325"/>
+            <a:ext cx="4876799" cy="838970"/>
+          </a:xfrm>
+          <a:prstGeom prst="rect">
+            <a:avLst/>
+          </a:prstGeom>
+          <a:solidFill>
+            <a:schemeClr val="accent2">
+              <a:lumMod val="40000"/>
+              <a:lumOff val="60000"/>
+              <a:alpha val="8000"/>
+            </a:schemeClr>
+          </a:solidFill>
+          <a:ln>
+            <a:solidFill>
+              <a:schemeClr val="accent2">
+                <a:lumMod val="40000"/>
+                <a:lumOff val="60000"/>
+                <a:alpha val="25000"/>
+              </a:schemeClr>
+            </a:solidFill>
+          </a:ln>
+        </p:spPr>
+        <p:style>
+          <a:lnRef idx="2">
+            <a:schemeClr val="accent1">
+              <a:shade val="50000"/>
+            </a:schemeClr>
+          </a:lnRef>
+          <a:fillRef idx="1">
+            <a:schemeClr val="accent1"/>
+          </a:fillRef>
+          <a:effectRef idx="0">
+            <a:schemeClr val="accent1"/>
+          </a:effectRef>
+          <a:fontRef idx="minor">
+            <a:schemeClr val="lt1"/>
+          </a:fontRef>
+        </p:style>
+        <p:txBody>
+          <a:bodyPr rtlCol="0" anchor="ctr"/>
+          <a:lstStyle/>
+          <a:p>
+            <a:pPr algn="ctr"/>
+            <a:endParaRPr lang="zh-TW" altLang="en-US"/>
+          </a:p>
+        </p:txBody>
+      </p:sp>
+      <p:sp>
+        <p:nvSpPr>
+          <p:cNvPr id="31" name="矩形 30">
+            <a:extLst>
+              <a:ext uri="{FF2B5EF4-FFF2-40B4-BE49-F238E27FC236}">
+                <a16:creationId xmlns:a16="http://schemas.microsoft.com/office/drawing/2014/main" id="{D4AD3322-0992-9179-DB18-1319E7E4BAA2}"/>
+              </a:ext>
+            </a:extLst>
+          </p:cNvPr>
+          <p:cNvSpPr/>
+          <p:nvPr/>
+        </p:nvSpPr>
+        <p:spPr>
+          <a:xfrm>
+            <a:off x="6446252" y="4954058"/>
+            <a:ext cx="922047" cy="253916"/>
+          </a:xfrm>
+          <a:prstGeom prst="rect">
+            <a:avLst/>
+          </a:prstGeom>
+          <a:noFill/>
+        </p:spPr>
+        <p:txBody>
+          <a:bodyPr wrap="none" lIns="91440" tIns="45720" rIns="91440" bIns="45720">
+            <a:spAutoFit/>
+          </a:bodyPr>
+          <a:lstStyle/>
+          <a:p>
+            <a:r>
+              <a:rPr lang="en-US" altLang="zh-TW" sz="1050" b="0" cap="none" spc="0" dirty="0">
+                <a:ln w="0"/>
+                <a:solidFill>
+                  <a:schemeClr val="bg2"/>
+                </a:solidFill>
+                <a:effectLst>
+                  <a:outerShdw blurRad="38100" dist="19050" dir="2700000" algn="tl" rotWithShape="0">
+                    <a:schemeClr val="dk1">
+                      <a:alpha val="40000"/>
+                    </a:schemeClr>
+                  </a:outerShdw>
+                </a:effectLst>
+                <a:latin typeface="Consolas" panose="020B0609020204030204" pitchFamily="49" charset="0"/>
+              </a:rPr>
+              <a:t>Print Char</a:t>
+            </a:r>
+            <a:endParaRPr lang="zh-TW" altLang="en-US" sz="1050" b="0" cap="none" spc="0" dirty="0">
+              <a:ln w="0"/>
+              <a:solidFill>
+                <a:schemeClr val="bg2"/>
+              </a:solidFill>
+              <a:effectLst>
+                <a:outerShdw blurRad="38100" dist="19050" dir="2700000" algn="tl" rotWithShape="0">
+                  <a:schemeClr val="dk1">
+                    <a:alpha val="40000"/>
+                  </a:schemeClr>
+                </a:outerShdw>
+              </a:effectLst>
+              <a:latin typeface="Consolas" panose="020B0609020204030204" pitchFamily="49" charset="0"/>
+            </a:endParaRPr>
+          </a:p>
+        </p:txBody>
+      </p:sp>
+      <p:sp>
+        <p:nvSpPr>
+          <p:cNvPr id="46" name="矩形 45">
+            <a:extLst>
+              <a:ext uri="{FF2B5EF4-FFF2-40B4-BE49-F238E27FC236}">
+                <a16:creationId xmlns:a16="http://schemas.microsoft.com/office/drawing/2014/main" id="{8A5F9541-F643-91A6-9053-67AAC16A2E9A}"/>
+              </a:ext>
+            </a:extLst>
+          </p:cNvPr>
+          <p:cNvSpPr/>
+          <p:nvPr/>
+        </p:nvSpPr>
+        <p:spPr>
+          <a:xfrm>
+            <a:off x="2788238" y="6492590"/>
+            <a:ext cx="5059680" cy="2104903"/>
+          </a:xfrm>
+          <a:prstGeom prst="rect">
+            <a:avLst/>
+          </a:prstGeom>
+          <a:solidFill>
+            <a:schemeClr val="accent5">
+              <a:lumMod val="40000"/>
+              <a:lumOff val="60000"/>
+              <a:alpha val="8000"/>
+            </a:schemeClr>
+          </a:solidFill>
+          <a:ln>
+            <a:solidFill>
+              <a:schemeClr val="accent5">
+                <a:lumMod val="40000"/>
+                <a:lumOff val="60000"/>
+                <a:alpha val="25000"/>
+              </a:schemeClr>
+            </a:solidFill>
+          </a:ln>
+        </p:spPr>
+        <p:style>
+          <a:lnRef idx="2">
+            <a:schemeClr val="accent1">
+              <a:shade val="50000"/>
+            </a:schemeClr>
+          </a:lnRef>
+          <a:fillRef idx="1">
+            <a:schemeClr val="accent1"/>
+          </a:fillRef>
+          <a:effectRef idx="0">
+            <a:schemeClr val="accent1"/>
+          </a:effectRef>
+          <a:fontRef idx="minor">
+            <a:schemeClr val="lt1"/>
+          </a:fontRef>
+        </p:style>
+        <p:txBody>
+          <a:bodyPr rtlCol="0" anchor="ctr"/>
+          <a:lstStyle/>
+          <a:p>
+            <a:pPr algn="ctr"/>
+            <a:endParaRPr lang="zh-TW" altLang="en-US"/>
+          </a:p>
+        </p:txBody>
+      </p:sp>
+      <p:sp>
+        <p:nvSpPr>
+          <p:cNvPr id="47" name="矩形 46">
+            <a:extLst>
+              <a:ext uri="{FF2B5EF4-FFF2-40B4-BE49-F238E27FC236}">
+                <a16:creationId xmlns:a16="http://schemas.microsoft.com/office/drawing/2014/main" id="{4044D16D-6A40-0B82-F8C0-585D81B2D999}"/>
+              </a:ext>
+            </a:extLst>
+          </p:cNvPr>
+          <p:cNvSpPr/>
+          <p:nvPr/>
+        </p:nvSpPr>
+        <p:spPr>
+          <a:xfrm>
+            <a:off x="7802198" y="6492590"/>
+            <a:ext cx="922047" cy="253916"/>
+          </a:xfrm>
+          <a:prstGeom prst="rect">
+            <a:avLst/>
+          </a:prstGeom>
+          <a:noFill/>
+        </p:spPr>
+        <p:txBody>
+          <a:bodyPr wrap="none" lIns="91440" tIns="45720" rIns="91440" bIns="45720">
+            <a:spAutoFit/>
+          </a:bodyPr>
+          <a:lstStyle/>
+          <a:p>
+            <a:r>
+              <a:rPr lang="en-US" altLang="zh-TW" sz="1050" b="0" cap="none" spc="0" dirty="0">
+                <a:ln w="0"/>
+                <a:solidFill>
+                  <a:schemeClr val="bg2"/>
+                </a:solidFill>
+                <a:effectLst>
+                  <a:outerShdw blurRad="38100" dist="19050" dir="2700000" algn="tl" rotWithShape="0">
+                    <a:schemeClr val="dk1">
+                      <a:alpha val="40000"/>
+                    </a:schemeClr>
+                  </a:outerShdw>
+                </a:effectLst>
+                <a:latin typeface="Consolas" panose="020B0609020204030204" pitchFamily="49" charset="0"/>
+              </a:rPr>
+              <a:t>Box Bottom</a:t>
+            </a:r>
+            <a:endParaRPr lang="zh-TW" altLang="en-US" sz="1050" b="0" cap="none" spc="0" dirty="0">
+              <a:ln w="0"/>
+              <a:solidFill>
+                <a:schemeClr val="bg2"/>
+              </a:solidFill>
+              <a:effectLst>
+                <a:outerShdw blurRad="38100" dist="19050" dir="2700000" algn="tl" rotWithShape="0">
+                  <a:schemeClr val="dk1">
+                    <a:alpha val="40000"/>
+                  </a:schemeClr>
+                </a:outerShdw>
+              </a:effectLst>
+              <a:latin typeface="Consolas" panose="020B0609020204030204" pitchFamily="49" charset="0"/>
+            </a:endParaRPr>
+          </a:p>
+        </p:txBody>
+      </p:sp>
+      <p:sp>
+        <p:nvSpPr>
+          <p:cNvPr id="48" name="矩形 47">
+            <a:extLst>
+              <a:ext uri="{FF2B5EF4-FFF2-40B4-BE49-F238E27FC236}">
+                <a16:creationId xmlns:a16="http://schemas.microsoft.com/office/drawing/2014/main" id="{4E9AD52C-2420-F35E-701F-88E07E3589BE}"/>
+              </a:ext>
+            </a:extLst>
+          </p:cNvPr>
+          <p:cNvSpPr/>
+          <p:nvPr/>
+        </p:nvSpPr>
+        <p:spPr>
+          <a:xfrm>
+            <a:off x="2871107" y="6653458"/>
+            <a:ext cx="4876799" cy="838970"/>
+          </a:xfrm>
+          <a:prstGeom prst="rect">
+            <a:avLst/>
+          </a:prstGeom>
+          <a:solidFill>
+            <a:schemeClr val="accent5">
+              <a:lumMod val="40000"/>
+              <a:lumOff val="60000"/>
+              <a:alpha val="8000"/>
+            </a:schemeClr>
+          </a:solidFill>
+          <a:ln>
+            <a:solidFill>
+              <a:schemeClr val="accent5">
+                <a:lumMod val="40000"/>
+                <a:lumOff val="60000"/>
+                <a:alpha val="25000"/>
+              </a:schemeClr>
+            </a:solidFill>
+          </a:ln>
+        </p:spPr>
+        <p:style>
+          <a:lnRef idx="2">
+            <a:schemeClr val="accent1">
+              <a:shade val="50000"/>
+            </a:schemeClr>
+          </a:lnRef>
+          <a:fillRef idx="1">
+            <a:schemeClr val="accent1"/>
+          </a:fillRef>
+          <a:effectRef idx="0">
+            <a:schemeClr val="accent1"/>
+          </a:effectRef>
+          <a:fontRef idx="minor">
+            <a:schemeClr val="lt1"/>
+          </a:fontRef>
+        </p:style>
+        <p:txBody>
+          <a:bodyPr rtlCol="0" anchor="ctr"/>
+          <a:lstStyle/>
+          <a:p>
+            <a:pPr algn="ctr"/>
+            <a:endParaRPr lang="zh-TW" altLang="en-US"/>
+          </a:p>
+        </p:txBody>
+      </p:sp>
+      <p:sp>
+        <p:nvSpPr>
+          <p:cNvPr id="49" name="矩形 48">
+            <a:extLst>
+              <a:ext uri="{FF2B5EF4-FFF2-40B4-BE49-F238E27FC236}">
+                <a16:creationId xmlns:a16="http://schemas.microsoft.com/office/drawing/2014/main" id="{6C7FF434-D863-2A57-C66F-50301EBFDB7D}"/>
+              </a:ext>
+            </a:extLst>
+          </p:cNvPr>
+          <p:cNvSpPr/>
+          <p:nvPr/>
+        </p:nvSpPr>
+        <p:spPr>
+          <a:xfrm>
+            <a:off x="6446252" y="6602194"/>
+            <a:ext cx="1069524" cy="253916"/>
+          </a:xfrm>
+          <a:prstGeom prst="rect">
+            <a:avLst/>
+          </a:prstGeom>
+          <a:noFill/>
+        </p:spPr>
+        <p:txBody>
+          <a:bodyPr wrap="none" lIns="91440" tIns="45720" rIns="91440" bIns="45720">
+            <a:spAutoFit/>
+          </a:bodyPr>
+          <a:lstStyle/>
+          <a:p>
+            <a:r>
+              <a:rPr lang="en-US" altLang="zh-TW" sz="1050" b="0" cap="none" spc="0" dirty="0">
+                <a:ln w="0"/>
+                <a:solidFill>
+                  <a:schemeClr val="bg2"/>
+                </a:solidFill>
+                <a:effectLst>
+                  <a:outerShdw blurRad="38100" dist="19050" dir="2700000" algn="tl" rotWithShape="0">
+                    <a:schemeClr val="dk1">
+                      <a:alpha val="40000"/>
+                    </a:schemeClr>
+                  </a:outerShdw>
+                </a:effectLst>
+                <a:latin typeface="Consolas" panose="020B0609020204030204" pitchFamily="49" charset="0"/>
+              </a:rPr>
+              <a:t>Change Color</a:t>
+            </a:r>
+            <a:endParaRPr lang="zh-TW" altLang="en-US" sz="1050" b="0" cap="none" spc="0" dirty="0">
+              <a:ln w="0"/>
+              <a:solidFill>
+                <a:schemeClr val="bg2"/>
+              </a:solidFill>
+              <a:effectLst>
+                <a:outerShdw blurRad="38100" dist="19050" dir="2700000" algn="tl" rotWithShape="0">
+                  <a:schemeClr val="dk1">
+                    <a:alpha val="40000"/>
+                  </a:schemeClr>
+                </a:outerShdw>
+              </a:effectLst>
+              <a:latin typeface="Consolas" panose="020B0609020204030204" pitchFamily="49" charset="0"/>
+            </a:endParaRPr>
+          </a:p>
+        </p:txBody>
+      </p:sp>
+      <p:sp>
+        <p:nvSpPr>
+          <p:cNvPr id="50" name="矩形 49">
+            <a:extLst>
+              <a:ext uri="{FF2B5EF4-FFF2-40B4-BE49-F238E27FC236}">
+                <a16:creationId xmlns:a16="http://schemas.microsoft.com/office/drawing/2014/main" id="{68A5C284-6243-ABD3-17C5-037AAE96FA4C}"/>
+              </a:ext>
+            </a:extLst>
+          </p:cNvPr>
+          <p:cNvSpPr/>
+          <p:nvPr/>
+        </p:nvSpPr>
+        <p:spPr>
+          <a:xfrm>
+            <a:off x="2871107" y="7728043"/>
+            <a:ext cx="4876799" cy="838970"/>
+          </a:xfrm>
+          <a:prstGeom prst="rect">
+            <a:avLst/>
+          </a:prstGeom>
+          <a:solidFill>
+            <a:schemeClr val="accent5">
+              <a:lumMod val="40000"/>
+              <a:lumOff val="60000"/>
+              <a:alpha val="8000"/>
+            </a:schemeClr>
+          </a:solidFill>
+          <a:ln>
+            <a:solidFill>
+              <a:schemeClr val="accent5">
+                <a:lumMod val="40000"/>
+                <a:lumOff val="60000"/>
+                <a:alpha val="25000"/>
+              </a:schemeClr>
+            </a:solidFill>
+          </a:ln>
+        </p:spPr>
+        <p:style>
+          <a:lnRef idx="2">
+            <a:schemeClr val="accent1">
+              <a:shade val="50000"/>
+            </a:schemeClr>
+          </a:lnRef>
+          <a:fillRef idx="1">
+            <a:schemeClr val="accent1"/>
+          </a:fillRef>
+          <a:effectRef idx="0">
+            <a:schemeClr val="accent1"/>
+          </a:effectRef>
+          <a:fontRef idx="minor">
+            <a:schemeClr val="lt1"/>
+          </a:fontRef>
+        </p:style>
+        <p:txBody>
+          <a:bodyPr rtlCol="0" anchor="ctr"/>
+          <a:lstStyle/>
+          <a:p>
+            <a:pPr algn="ctr"/>
+            <a:endParaRPr lang="zh-TW" altLang="en-US"/>
+          </a:p>
+        </p:txBody>
+      </p:sp>
+      <p:sp>
+        <p:nvSpPr>
+          <p:cNvPr id="51" name="矩形 50">
+            <a:extLst>
+              <a:ext uri="{FF2B5EF4-FFF2-40B4-BE49-F238E27FC236}">
+                <a16:creationId xmlns:a16="http://schemas.microsoft.com/office/drawing/2014/main" id="{DCB54736-26D7-F834-DCBC-F461B8AE1D05}"/>
+              </a:ext>
+            </a:extLst>
+          </p:cNvPr>
+          <p:cNvSpPr/>
+          <p:nvPr/>
+        </p:nvSpPr>
+        <p:spPr>
+          <a:xfrm>
+            <a:off x="6446252" y="7689776"/>
+            <a:ext cx="922047" cy="253916"/>
+          </a:xfrm>
+          <a:prstGeom prst="rect">
+            <a:avLst/>
+          </a:prstGeom>
+          <a:noFill/>
+        </p:spPr>
+        <p:txBody>
+          <a:bodyPr wrap="none" lIns="91440" tIns="45720" rIns="91440" bIns="45720">
+            <a:spAutoFit/>
+          </a:bodyPr>
+          <a:lstStyle/>
+          <a:p>
+            <a:r>
+              <a:rPr lang="en-US" altLang="zh-TW" sz="1050" b="0" cap="none" spc="0" dirty="0">
+                <a:ln w="0"/>
+                <a:solidFill>
+                  <a:schemeClr val="bg2"/>
+                </a:solidFill>
+                <a:effectLst>
+                  <a:outerShdw blurRad="38100" dist="19050" dir="2700000" algn="tl" rotWithShape="0">
+                    <a:schemeClr val="dk1">
+                      <a:alpha val="40000"/>
+                    </a:schemeClr>
+                  </a:outerShdw>
+                </a:effectLst>
+                <a:latin typeface="Consolas" panose="020B0609020204030204" pitchFamily="49" charset="0"/>
+              </a:rPr>
+              <a:t>Print Char</a:t>
+            </a:r>
+            <a:endParaRPr lang="zh-TW" altLang="en-US" sz="1050" b="0" cap="none" spc="0" dirty="0">
+              <a:ln w="0"/>
+              <a:solidFill>
+                <a:schemeClr val="bg2"/>
+              </a:solidFill>
+              <a:effectLst>
+                <a:outerShdw blurRad="38100" dist="19050" dir="2700000" algn="tl" rotWithShape="0">
+                  <a:schemeClr val="dk1">
+                    <a:alpha val="40000"/>
+                  </a:schemeClr>
+                </a:outerShdw>
+              </a:effectLst>
+              <a:latin typeface="Consolas" panose="020B0609020204030204" pitchFamily="49" charset="0"/>
+            </a:endParaRPr>
+          </a:p>
+        </p:txBody>
+      </p:sp>
+    </p:spTree>
+    <p:extLst>
+      <p:ext uri="{BB962C8B-B14F-4D97-AF65-F5344CB8AC3E}">
+        <p14:creationId xmlns:p14="http://schemas.microsoft.com/office/powerpoint/2010/main" val="1349275817"/>
       </p:ext>
     </p:extLst>
   </p:cSld>

</xml_diff>